<commit_message>
aligned and increase image clearity
</commit_message>
<xml_diff>
--- a/poster/poster3.pptx
+++ b/poster/poster3.pptx
@@ -6849,10 +6849,10 @@
       </p:grpSpPr>
       <p:pic>
         <p:nvPicPr>
-          <p:cNvPr id="86" name="Picture 85">
+          <p:cNvPr id="16" name="Picture 15">
             <a:extLst>
               <a:ext uri="{FF2B5EF4-FFF2-40B4-BE49-F238E27FC236}">
-                <a16:creationId xmlns:a16="http://schemas.microsoft.com/office/drawing/2014/main" id="{4822EC51-A0EC-465D-8217-3AC1F11F32E2}"/>
+                <a16:creationId xmlns:a16="http://schemas.microsoft.com/office/drawing/2014/main" id="{417F33B5-1362-4579-BC5A-84066CE53DFD}"/>
               </a:ext>
             </a:extLst>
           </p:cNvPr>
@@ -6861,7 +6861,7 @@
           </p:cNvPicPr>
           <p:nvPr/>
         </p:nvPicPr>
-        <p:blipFill>
+        <p:blipFill rotWithShape="1">
           <a:blip r:embed="rId2">
             <a:extLst>
               <a:ext uri="{28A0092B-C50C-407E-A947-70E740481C1C}">
@@ -6869,14 +6869,48 @@
               </a:ext>
             </a:extLst>
           </a:blip>
-          <a:stretch>
-            <a:fillRect/>
-          </a:stretch>
+          <a:srcRect l="3545" t="3666" r="3353" b="2167"/>
+          <a:stretch/>
         </p:blipFill>
         <p:spPr>
           <a:xfrm>
-            <a:off x="619853" y="16904316"/>
-            <a:ext cx="5600700" cy="5257800"/>
+            <a:off x="994580" y="32106119"/>
+            <a:ext cx="4773427" cy="5093115"/>
+          </a:xfrm>
+          <a:prstGeom prst="rect">
+            <a:avLst/>
+          </a:prstGeom>
+        </p:spPr>
+      </p:pic>
+      <p:pic>
+        <p:nvPicPr>
+          <p:cNvPr id="13" name="Picture 12">
+            <a:extLst>
+              <a:ext uri="{FF2B5EF4-FFF2-40B4-BE49-F238E27FC236}">
+                <a16:creationId xmlns:a16="http://schemas.microsoft.com/office/drawing/2014/main" id="{BCB546BB-E7D0-4777-A3E7-203DFBCDDA81}"/>
+              </a:ext>
+            </a:extLst>
+          </p:cNvPr>
+          <p:cNvPicPr>
+            <a:picLocks noChangeAspect="1"/>
+          </p:cNvPicPr>
+          <p:nvPr/>
+        </p:nvPicPr>
+        <p:blipFill rotWithShape="1">
+          <a:blip r:embed="rId3">
+            <a:extLst>
+              <a:ext uri="{28A0092B-C50C-407E-A947-70E740481C1C}">
+                <a14:useLocalDpi xmlns:a14="http://schemas.microsoft.com/office/drawing/2010/main" val="0"/>
+              </a:ext>
+            </a:extLst>
+          </a:blip>
+          <a:srcRect l="2839" t="4214" r="3789" b="3964"/>
+          <a:stretch/>
+        </p:blipFill>
+        <p:spPr>
+          <a:xfrm>
+            <a:off x="716880" y="17049021"/>
+            <a:ext cx="5287582" cy="4855104"/>
           </a:xfrm>
           <a:prstGeom prst="rect">
             <a:avLst/>
@@ -7482,7 +7516,7 @@
             </p:xfrm>
             <a:graphic>
               <a:graphicData uri="http://schemas.openxmlformats.org/drawingml/2006/chart">
-                <c:chart xmlns:c="http://schemas.openxmlformats.org/drawingml/2006/chart" xmlns:r="http://schemas.openxmlformats.org/officeDocument/2006/relationships" r:id="rId3"/>
+                <c:chart xmlns:c="http://schemas.openxmlformats.org/drawingml/2006/chart" xmlns:r="http://schemas.openxmlformats.org/officeDocument/2006/relationships" r:id="rId4"/>
               </a:graphicData>
             </a:graphic>
           </p:graphicFrame>
@@ -9310,8 +9344,8 @@
         </p:nvSpPr>
         <p:spPr>
           <a:xfrm>
-            <a:off x="16024803" y="38662680"/>
-            <a:ext cx="13764993" cy="2784993"/>
+            <a:off x="15945343" y="38759915"/>
+            <a:ext cx="13764993" cy="2612638"/>
           </a:xfrm>
           <a:prstGeom prst="rect">
             <a:avLst/>
@@ -9332,40 +9366,32 @@
               <a:buAutoNum type="arabicPeriod"/>
             </a:pPr>
             <a:r>
-              <a:rPr lang="en-IN" sz="3200" dirty="0" err="1">
-                <a:latin typeface="CMR10"/>
+              <a:rPr lang="en-IN" sz="2900" dirty="0" err="1">
+                <a:latin typeface="Arial" panose="020B0604020202020204" pitchFamily="34" charset="0"/>
+                <a:cs typeface="Arial" panose="020B0604020202020204" pitchFamily="34" charset="0"/>
               </a:rPr>
               <a:t>Yichao</a:t>
             </a:r>
             <a:r>
-              <a:rPr lang="en-IN" sz="3200" dirty="0">
-                <a:latin typeface="CMR10"/>
+              <a:rPr lang="en-IN" sz="2900" dirty="0">
+                <a:latin typeface="Arial" panose="020B0604020202020204" pitchFamily="34" charset="0"/>
+                <a:cs typeface="Arial" panose="020B0604020202020204" pitchFamily="34" charset="0"/>
               </a:rPr>
               <a:t> Zhou and </a:t>
             </a:r>
             <a:r>
-              <a:rPr lang="en-IN" sz="3200" dirty="0" err="1">
-                <a:latin typeface="CMR10"/>
+              <a:rPr lang="en-IN" sz="2900" dirty="0" err="1">
+                <a:latin typeface="Arial" panose="020B0604020202020204" pitchFamily="34" charset="0"/>
+                <a:cs typeface="Arial" panose="020B0604020202020204" pitchFamily="34" charset="0"/>
               </a:rPr>
               <a:t>Jianyang</a:t>
             </a:r>
             <a:r>
-              <a:rPr lang="en-IN" sz="3200" dirty="0">
-                <a:latin typeface="CMR10"/>
+              <a:rPr lang="en-IN" sz="2900" dirty="0">
+                <a:latin typeface="Arial" panose="020B0604020202020204" pitchFamily="34" charset="0"/>
+                <a:cs typeface="Arial" panose="020B0604020202020204" pitchFamily="34" charset="0"/>
               </a:rPr>
-              <a:t> Zeng. “Massively Parallel A* Search on GPU”. In: </a:t>
-            </a:r>
-            <a:r>
-              <a:rPr lang="en-IN" sz="3200" dirty="0">
-                <a:latin typeface="CMTI10"/>
-              </a:rPr>
-              <a:t>Twenty-Ninth AAAI Conference on Artificial Intelligence </a:t>
-            </a:r>
-            <a:r>
-              <a:rPr lang="en-IN" sz="3200" dirty="0">
-                <a:latin typeface="CMR10"/>
-              </a:rPr>
-              <a:t>(2015).</a:t>
+              <a:t> Zeng. “Massively Parallel A* Search on GPU”. In: Twenty-Ninth AAAI Conference on Artificial Intelligence (2015).</a:t>
             </a:r>
           </a:p>
           <a:p>
@@ -9377,75 +9403,63 @@
               <a:buAutoNum type="arabicPeriod"/>
             </a:pPr>
             <a:r>
-              <a:rPr lang="en-IN" sz="3200" dirty="0">
+              <a:rPr lang="en-IN" sz="2900" dirty="0">
                 <a:solidFill>
                   <a:srgbClr val="000000"/>
                 </a:solidFill>
-                <a:latin typeface="CMR10"/>
+                <a:latin typeface="Arial" panose="020B0604020202020204" pitchFamily="34" charset="0"/>
+                <a:cs typeface="Arial" panose="020B0604020202020204" pitchFamily="34" charset="0"/>
               </a:rPr>
               <a:t>Jure </a:t>
             </a:r>
             <a:r>
-              <a:rPr lang="en-IN" sz="3200" dirty="0" err="1">
+              <a:rPr lang="en-IN" sz="2900" dirty="0" err="1">
                 <a:solidFill>
                   <a:srgbClr val="000000"/>
                 </a:solidFill>
-                <a:latin typeface="CMR10"/>
+                <a:latin typeface="Arial" panose="020B0604020202020204" pitchFamily="34" charset="0"/>
+                <a:cs typeface="Arial" panose="020B0604020202020204" pitchFamily="34" charset="0"/>
               </a:rPr>
               <a:t>Leskovec</a:t>
             </a:r>
             <a:r>
-              <a:rPr lang="en-IN" sz="3200" dirty="0">
+              <a:rPr lang="en-IN" sz="2900" dirty="0">
                 <a:solidFill>
                   <a:srgbClr val="000000"/>
                 </a:solidFill>
-                <a:latin typeface="CMR10"/>
+                <a:latin typeface="Arial" panose="020B0604020202020204" pitchFamily="34" charset="0"/>
+                <a:cs typeface="Arial" panose="020B0604020202020204" pitchFamily="34" charset="0"/>
               </a:rPr>
               <a:t> and Andrej </a:t>
             </a:r>
             <a:r>
-              <a:rPr lang="en-IN" sz="3200" dirty="0" err="1">
+              <a:rPr lang="en-IN" sz="2900" dirty="0" err="1">
                 <a:solidFill>
                   <a:srgbClr val="000000"/>
                 </a:solidFill>
-                <a:latin typeface="CMR10"/>
+                <a:latin typeface="Arial" panose="020B0604020202020204" pitchFamily="34" charset="0"/>
+                <a:cs typeface="Arial" panose="020B0604020202020204" pitchFamily="34" charset="0"/>
               </a:rPr>
               <a:t>Krevl</a:t>
             </a:r>
             <a:r>
-              <a:rPr lang="en-IN" sz="3200" dirty="0">
+              <a:rPr lang="en-IN" sz="2900" dirty="0">
                 <a:solidFill>
                   <a:srgbClr val="000000"/>
                 </a:solidFill>
-                <a:latin typeface="CMR10"/>
+                <a:latin typeface="Arial" panose="020B0604020202020204" pitchFamily="34" charset="0"/>
+                <a:cs typeface="Arial" panose="020B0604020202020204" pitchFamily="34" charset="0"/>
               </a:rPr>
-              <a:t>. </a:t>
-            </a:r>
-            <a:r>
-              <a:rPr lang="en-IN" sz="3200" dirty="0">
-                <a:solidFill>
-                  <a:srgbClr val="000000"/>
-                </a:solidFill>
-                <a:latin typeface="CMTI10"/>
-              </a:rPr>
-              <a:t>SNAP Datasets: Stanford Large Network Dataset Collection</a:t>
-            </a:r>
-            <a:r>
-              <a:rPr lang="en-IN" sz="3200" dirty="0">
-                <a:solidFill>
-                  <a:srgbClr val="000000"/>
-                </a:solidFill>
-                <a:latin typeface="CMR10"/>
-              </a:rPr>
-              <a:t>. </a:t>
-            </a:r>
-            <a:r>
-              <a:rPr lang="en-IN" sz="3200" dirty="0">
+              <a:t>. SNAP Datasets: Stanford Large Network Dataset Collection. </a:t>
+            </a:r>
+            <a:r>
+              <a:rPr lang="en-IN" sz="2900" dirty="0">
                 <a:solidFill>
                   <a:srgbClr val="820C00"/>
                 </a:solidFill>
-                <a:latin typeface="CMTT10"/>
-                <a:hlinkClick r:id="rId4">
+                <a:latin typeface="Arial" panose="020B0604020202020204" pitchFamily="34" charset="0"/>
+                <a:cs typeface="Arial" panose="020B0604020202020204" pitchFamily="34" charset="0"/>
+                <a:hlinkClick r:id="rId5">
                   <a:extLst>
                     <a:ext uri="{A12FA001-AC4F-418D-AE19-62706E023703}">
                       <ahyp:hlinkClr xmlns:ahyp="http://schemas.microsoft.com/office/drawing/2018/hyperlinkcolor" val="tx"/>
@@ -9456,16 +9470,18 @@
               <a:t>http://snap.stanford.edu/data</a:t>
             </a:r>
             <a:r>
-              <a:rPr lang="en-IN" sz="3200" dirty="0">
+              <a:rPr lang="en-IN" sz="2900" dirty="0">
                 <a:solidFill>
                   <a:srgbClr val="000000"/>
                 </a:solidFill>
-                <a:latin typeface="CMR10"/>
+                <a:latin typeface="Arial" panose="020B0604020202020204" pitchFamily="34" charset="0"/>
+                <a:cs typeface="Arial" panose="020B0604020202020204" pitchFamily="34" charset="0"/>
               </a:rPr>
               <a:t>. June 2014.</a:t>
             </a:r>
-            <a:endParaRPr lang="en-IN" sz="3200" dirty="0">
-              <a:latin typeface="Domine" panose="02040503040403060204" pitchFamily="18" charset="0"/>
+            <a:endParaRPr lang="en-IN" sz="2900" dirty="0">
+              <a:latin typeface="Arial" panose="020B0604020202020204" pitchFamily="34" charset="0"/>
+              <a:cs typeface="Arial" panose="020B0604020202020204" pitchFamily="34" charset="0"/>
             </a:endParaRPr>
           </a:p>
         </p:txBody>
@@ -10836,13 +10852,13 @@
             <p:nvPr/>
           </p:nvPicPr>
           <p:blipFill>
-            <a:blip r:embed="rId5">
+            <a:blip r:embed="rId6">
               <a:extLst>
                 <a:ext uri="{28A0092B-C50C-407E-A947-70E740481C1C}">
                   <a14:useLocalDpi xmlns:a14="http://schemas.microsoft.com/office/drawing/2010/main" val="0"/>
                 </a:ext>
                 <a:ext uri="{96DAC541-7B7A-43D3-8B79-37D633B846F1}">
-                  <asvg:svgBlip xmlns:asvg="http://schemas.microsoft.com/office/drawing/2016/SVG/main" r:embed="rId6"/>
+                  <asvg:svgBlip xmlns:asvg="http://schemas.microsoft.com/office/drawing/2016/SVG/main" r:embed="rId7"/>
                 </a:ext>
               </a:extLst>
             </a:blip>
@@ -10875,13 +10891,13 @@
             <p:nvPr/>
           </p:nvPicPr>
           <p:blipFill>
-            <a:blip r:embed="rId5">
+            <a:blip r:embed="rId6">
               <a:extLst>
                 <a:ext uri="{28A0092B-C50C-407E-A947-70E740481C1C}">
                   <a14:useLocalDpi xmlns:a14="http://schemas.microsoft.com/office/drawing/2010/main" val="0"/>
                 </a:ext>
                 <a:ext uri="{96DAC541-7B7A-43D3-8B79-37D633B846F1}">
-                  <asvg:svgBlip xmlns:asvg="http://schemas.microsoft.com/office/drawing/2016/SVG/main" r:embed="rId6"/>
+                  <asvg:svgBlip xmlns:asvg="http://schemas.microsoft.com/office/drawing/2016/SVG/main" r:embed="rId7"/>
                 </a:ext>
               </a:extLst>
             </a:blip>
@@ -10914,13 +10930,13 @@
             <p:nvPr/>
           </p:nvPicPr>
           <p:blipFill>
-            <a:blip r:embed="rId7">
+            <a:blip r:embed="rId8">
               <a:extLst>
                 <a:ext uri="{28A0092B-C50C-407E-A947-70E740481C1C}">
                   <a14:useLocalDpi xmlns:a14="http://schemas.microsoft.com/office/drawing/2010/main" val="0"/>
                 </a:ext>
                 <a:ext uri="{96DAC541-7B7A-43D3-8B79-37D633B846F1}">
-                  <asvg:svgBlip xmlns:asvg="http://schemas.microsoft.com/office/drawing/2016/SVG/main" r:embed="rId8"/>
+                  <asvg:svgBlip xmlns:asvg="http://schemas.microsoft.com/office/drawing/2016/SVG/main" r:embed="rId9"/>
                 </a:ext>
               </a:extLst>
             </a:blip>
@@ -10953,13 +10969,13 @@
             <p:nvPr/>
           </p:nvPicPr>
           <p:blipFill>
-            <a:blip r:embed="rId7">
+            <a:blip r:embed="rId8">
               <a:extLst>
                 <a:ext uri="{28A0092B-C50C-407E-A947-70E740481C1C}">
                   <a14:useLocalDpi xmlns:a14="http://schemas.microsoft.com/office/drawing/2010/main" val="0"/>
                 </a:ext>
                 <a:ext uri="{96DAC541-7B7A-43D3-8B79-37D633B846F1}">
-                  <asvg:svgBlip xmlns:asvg="http://schemas.microsoft.com/office/drawing/2016/SVG/main" r:embed="rId8"/>
+                  <asvg:svgBlip xmlns:asvg="http://schemas.microsoft.com/office/drawing/2016/SVG/main" r:embed="rId9"/>
                 </a:ext>
               </a:extLst>
             </a:blip>
@@ -10992,13 +11008,13 @@
             <p:nvPr/>
           </p:nvPicPr>
           <p:blipFill>
-            <a:blip r:embed="rId7">
+            <a:blip r:embed="rId8">
               <a:extLst>
                 <a:ext uri="{28A0092B-C50C-407E-A947-70E740481C1C}">
                   <a14:useLocalDpi xmlns:a14="http://schemas.microsoft.com/office/drawing/2010/main" val="0"/>
                 </a:ext>
                 <a:ext uri="{96DAC541-7B7A-43D3-8B79-37D633B846F1}">
-                  <asvg:svgBlip xmlns:asvg="http://schemas.microsoft.com/office/drawing/2016/SVG/main" r:embed="rId8"/>
+                  <asvg:svgBlip xmlns:asvg="http://schemas.microsoft.com/office/drawing/2016/SVG/main" r:embed="rId9"/>
                 </a:ext>
               </a:extLst>
             </a:blip>
@@ -11031,13 +11047,13 @@
             <p:nvPr/>
           </p:nvPicPr>
           <p:blipFill>
-            <a:blip r:embed="rId7">
+            <a:blip r:embed="rId8">
               <a:extLst>
                 <a:ext uri="{28A0092B-C50C-407E-A947-70E740481C1C}">
                   <a14:useLocalDpi xmlns:a14="http://schemas.microsoft.com/office/drawing/2010/main" val="0"/>
                 </a:ext>
                 <a:ext uri="{96DAC541-7B7A-43D3-8B79-37D633B846F1}">
-                  <asvg:svgBlip xmlns:asvg="http://schemas.microsoft.com/office/drawing/2016/SVG/main" r:embed="rId8"/>
+                  <asvg:svgBlip xmlns:asvg="http://schemas.microsoft.com/office/drawing/2016/SVG/main" r:embed="rId9"/>
                 </a:ext>
               </a:extLst>
             </a:blip>
@@ -11070,13 +11086,13 @@
             <p:nvPr/>
           </p:nvPicPr>
           <p:blipFill>
-            <a:blip r:embed="rId7">
+            <a:blip r:embed="rId8">
               <a:extLst>
                 <a:ext uri="{28A0092B-C50C-407E-A947-70E740481C1C}">
                   <a14:useLocalDpi xmlns:a14="http://schemas.microsoft.com/office/drawing/2010/main" val="0"/>
                 </a:ext>
                 <a:ext uri="{96DAC541-7B7A-43D3-8B79-37D633B846F1}">
-                  <asvg:svgBlip xmlns:asvg="http://schemas.microsoft.com/office/drawing/2016/SVG/main" r:embed="rId8"/>
+                  <asvg:svgBlip xmlns:asvg="http://schemas.microsoft.com/office/drawing/2016/SVG/main" r:embed="rId9"/>
                 </a:ext>
               </a:extLst>
             </a:blip>
@@ -11109,13 +11125,13 @@
             <p:nvPr/>
           </p:nvPicPr>
           <p:blipFill>
-            <a:blip r:embed="rId7">
+            <a:blip r:embed="rId8">
               <a:extLst>
                 <a:ext uri="{28A0092B-C50C-407E-A947-70E740481C1C}">
                   <a14:useLocalDpi xmlns:a14="http://schemas.microsoft.com/office/drawing/2010/main" val="0"/>
                 </a:ext>
                 <a:ext uri="{96DAC541-7B7A-43D3-8B79-37D633B846F1}">
-                  <asvg:svgBlip xmlns:asvg="http://schemas.microsoft.com/office/drawing/2016/SVG/main" r:embed="rId8"/>
+                  <asvg:svgBlip xmlns:asvg="http://schemas.microsoft.com/office/drawing/2016/SVG/main" r:embed="rId9"/>
                 </a:ext>
               </a:extLst>
             </a:blip>
@@ -11682,7 +11698,7 @@
           <p:nvPr/>
         </p:nvPicPr>
         <p:blipFill rotWithShape="1">
-          <a:blip r:embed="rId9">
+          <a:blip r:embed="rId10">
             <a:extLst>
               <a:ext uri="{28A0092B-C50C-407E-A947-70E740481C1C}">
                 <a14:useLocalDpi xmlns:a14="http://schemas.microsoft.com/office/drawing/2010/main" val="0"/>
@@ -11746,7 +11762,7 @@
           </p:xfrm>
           <a:graphic>
             <a:graphicData uri="http://schemas.openxmlformats.org/drawingml/2006/chart">
-              <c:chart xmlns:c="http://schemas.openxmlformats.org/drawingml/2006/chart" xmlns:r="http://schemas.openxmlformats.org/officeDocument/2006/relationships" r:id="rId10"/>
+              <c:chart xmlns:c="http://schemas.openxmlformats.org/drawingml/2006/chart" xmlns:r="http://schemas.openxmlformats.org/officeDocument/2006/relationships" r:id="rId11"/>
             </a:graphicData>
           </a:graphic>
         </p:graphicFrame>
@@ -11841,7 +11857,7 @@
           <a:p>
             <a:r>
               <a:rPr lang="en-IN" sz="2200" dirty="0"/>
-              <a:t>Fig 2: Execution time of static A* and dynamic A*(only insertions) on graph Wiki-Talk</a:t>
+              <a:t>Fig 2: Execution time of static A* and dynamic A* (for only insertions) on graph Wiki-Talk</a:t>
             </a:r>
           </a:p>
         </p:txBody>
@@ -11861,9 +11877,9 @@
         <p:grpSpPr>
           <a:xfrm>
             <a:off x="269055" y="22918420"/>
-            <a:ext cx="12725041" cy="3821947"/>
+            <a:ext cx="13570225" cy="3821947"/>
             <a:chOff x="269055" y="22918420"/>
-            <a:chExt cx="12725041" cy="3821947"/>
+            <a:chExt cx="13570225" cy="3821947"/>
           </a:xfrm>
         </p:grpSpPr>
         <p:sp>
@@ -11880,8 +11896,8 @@
           </p:nvSpPr>
           <p:spPr>
             <a:xfrm>
-              <a:off x="10233217" y="25098015"/>
-              <a:ext cx="2760879" cy="553998"/>
+              <a:off x="10381352" y="24955774"/>
+              <a:ext cx="3457928" cy="1015663"/>
             </a:xfrm>
             <a:prstGeom prst="rect">
               <a:avLst/>
@@ -11905,6 +11921,18 @@
                 <a:t>Dynamic A*</a:t>
               </a:r>
             </a:p>
+            <a:p>
+              <a:r>
+                <a:rPr lang="en-IN" sz="3000" dirty="0">
+                  <a:solidFill>
+                    <a:srgbClr val="000760"/>
+                  </a:solidFill>
+                  <a:latin typeface="Roboto" panose="02000000000000000000" pitchFamily="2" charset="0"/>
+                  <a:ea typeface="Roboto" panose="02000000000000000000" pitchFamily="2" charset="0"/>
+                </a:rPr>
+                <a:t>( Insertions )</a:t>
+              </a:r>
+            </a:p>
           </p:txBody>
         </p:sp>
         <p:grpSp>
@@ -11922,9 +11950,9 @@
           <p:grpSpPr>
             <a:xfrm>
               <a:off x="269055" y="22918420"/>
-              <a:ext cx="12245709" cy="3821947"/>
+              <a:ext cx="12440313" cy="3821947"/>
               <a:chOff x="481900" y="22820160"/>
-              <a:chExt cx="12245709" cy="3821947"/>
+              <a:chExt cx="12440313" cy="3821947"/>
             </a:xfrm>
           </p:grpSpPr>
           <p:sp>
@@ -12478,13 +12506,13 @@
               <p:nvPr/>
             </p:nvPicPr>
             <p:blipFill>
-              <a:blip r:embed="rId11">
+              <a:blip r:embed="rId12">
                 <a:extLst>
                   <a:ext uri="{28A0092B-C50C-407E-A947-70E740481C1C}">
                     <a14:useLocalDpi xmlns:a14="http://schemas.microsoft.com/office/drawing/2010/main" val="0"/>
                   </a:ext>
                   <a:ext uri="{96DAC541-7B7A-43D3-8B79-37D633B846F1}">
-                    <asvg:svgBlip xmlns:asvg="http://schemas.microsoft.com/office/drawing/2016/SVG/main" r:embed="rId12"/>
+                    <asvg:svgBlip xmlns:asvg="http://schemas.microsoft.com/office/drawing/2016/SVG/main" r:embed="rId13"/>
                   </a:ext>
                 </a:extLst>
               </a:blip>
@@ -12494,7 +12522,7 @@
             </p:blipFill>
             <p:spPr>
               <a:xfrm flipH="1">
-                <a:off x="8951630" y="23080891"/>
+                <a:off x="8975826" y="23248751"/>
                 <a:ext cx="1328799" cy="1328799"/>
               </a:xfrm>
               <a:prstGeom prst="rect">
@@ -12517,13 +12545,13 @@
               <p:nvPr/>
             </p:nvPicPr>
             <p:blipFill>
-              <a:blip r:embed="rId13">
+              <a:blip r:embed="rId14">
                 <a:extLst>
                   <a:ext uri="{28A0092B-C50C-407E-A947-70E740481C1C}">
                     <a14:useLocalDpi xmlns:a14="http://schemas.microsoft.com/office/drawing/2010/main" val="0"/>
                   </a:ext>
                   <a:ext uri="{96DAC541-7B7A-43D3-8B79-37D633B846F1}">
-                    <asvg:svgBlip xmlns:asvg="http://schemas.microsoft.com/office/drawing/2016/SVG/main" r:embed="rId14"/>
+                    <asvg:svgBlip xmlns:asvg="http://schemas.microsoft.com/office/drawing/2016/SVG/main" r:embed="rId15"/>
                   </a:ext>
                 </a:extLst>
               </a:blip>
@@ -12555,7 +12583,7 @@
             </p:nvSpPr>
             <p:spPr>
               <a:xfrm>
-                <a:off x="10461152" y="23433002"/>
+                <a:off x="10655756" y="23571241"/>
                 <a:ext cx="2266457" cy="553998"/>
               </a:xfrm>
               <a:prstGeom prst="rect">
@@ -12638,13 +12666,13 @@
               <p:nvPr/>
             </p:nvPicPr>
             <p:blipFill>
-              <a:blip r:embed="rId15">
+              <a:blip r:embed="rId16">
                 <a:extLst>
                   <a:ext uri="{28A0092B-C50C-407E-A947-70E740481C1C}">
                     <a14:useLocalDpi xmlns:a14="http://schemas.microsoft.com/office/drawing/2010/main" val="0"/>
                   </a:ext>
                   <a:ext uri="{96DAC541-7B7A-43D3-8B79-37D633B846F1}">
-                    <asvg:svgBlip xmlns:asvg="http://schemas.microsoft.com/office/drawing/2016/SVG/main" r:embed="rId16"/>
+                    <asvg:svgBlip xmlns:asvg="http://schemas.microsoft.com/office/drawing/2016/SVG/main" r:embed="rId17"/>
                   </a:ext>
                 </a:extLst>
               </a:blip>
@@ -12677,13 +12705,13 @@
               <p:nvPr/>
             </p:nvPicPr>
             <p:blipFill>
-              <a:blip r:embed="rId15">
+              <a:blip r:embed="rId16">
                 <a:extLst>
                   <a:ext uri="{28A0092B-C50C-407E-A947-70E740481C1C}">
                     <a14:useLocalDpi xmlns:a14="http://schemas.microsoft.com/office/drawing/2010/main" val="0"/>
                   </a:ext>
                   <a:ext uri="{96DAC541-7B7A-43D3-8B79-37D633B846F1}">
-                    <asvg:svgBlip xmlns:asvg="http://schemas.microsoft.com/office/drawing/2016/SVG/main" r:embed="rId16"/>
+                    <asvg:svgBlip xmlns:asvg="http://schemas.microsoft.com/office/drawing/2016/SVG/main" r:embed="rId17"/>
                   </a:ext>
                 </a:extLst>
               </a:blip>
@@ -12716,13 +12744,13 @@
               <p:nvPr/>
             </p:nvPicPr>
             <p:blipFill>
-              <a:blip r:embed="rId15">
+              <a:blip r:embed="rId16">
                 <a:extLst>
                   <a:ext uri="{28A0092B-C50C-407E-A947-70E740481C1C}">
                     <a14:useLocalDpi xmlns:a14="http://schemas.microsoft.com/office/drawing/2010/main" val="0"/>
                   </a:ext>
                   <a:ext uri="{96DAC541-7B7A-43D3-8B79-37D633B846F1}">
-                    <asvg:svgBlip xmlns:asvg="http://schemas.microsoft.com/office/drawing/2016/SVG/main" r:embed="rId16"/>
+                    <asvg:svgBlip xmlns:asvg="http://schemas.microsoft.com/office/drawing/2016/SVG/main" r:embed="rId17"/>
                   </a:ext>
                 </a:extLst>
               </a:blip>
@@ -12755,13 +12783,13 @@
               <p:nvPr/>
             </p:nvPicPr>
             <p:blipFill>
-              <a:blip r:embed="rId15">
+              <a:blip r:embed="rId16">
                 <a:extLst>
                   <a:ext uri="{28A0092B-C50C-407E-A947-70E740481C1C}">
                     <a14:useLocalDpi xmlns:a14="http://schemas.microsoft.com/office/drawing/2010/main" val="0"/>
                   </a:ext>
                   <a:ext uri="{96DAC541-7B7A-43D3-8B79-37D633B846F1}">
-                    <asvg:svgBlip xmlns:asvg="http://schemas.microsoft.com/office/drawing/2016/SVG/main" r:embed="rId16"/>
+                    <asvg:svgBlip xmlns:asvg="http://schemas.microsoft.com/office/drawing/2016/SVG/main" r:embed="rId17"/>
                   </a:ext>
                 </a:extLst>
               </a:blip>
@@ -12794,13 +12822,13 @@
               <p:nvPr/>
             </p:nvPicPr>
             <p:blipFill>
-              <a:blip r:embed="rId15">
+              <a:blip r:embed="rId16">
                 <a:extLst>
                   <a:ext uri="{28A0092B-C50C-407E-A947-70E740481C1C}">
                     <a14:useLocalDpi xmlns:a14="http://schemas.microsoft.com/office/drawing/2010/main" val="0"/>
                   </a:ext>
                   <a:ext uri="{96DAC541-7B7A-43D3-8B79-37D633B846F1}">
-                    <asvg:svgBlip xmlns:asvg="http://schemas.microsoft.com/office/drawing/2016/SVG/main" r:embed="rId16"/>
+                    <asvg:svgBlip xmlns:asvg="http://schemas.microsoft.com/office/drawing/2016/SVG/main" r:embed="rId17"/>
                   </a:ext>
                 </a:extLst>
               </a:blip>
@@ -12833,13 +12861,13 @@
               <p:nvPr/>
             </p:nvPicPr>
             <p:blipFill>
-              <a:blip r:embed="rId11">
+              <a:blip r:embed="rId12">
                 <a:extLst>
                   <a:ext uri="{28A0092B-C50C-407E-A947-70E740481C1C}">
                     <a14:useLocalDpi xmlns:a14="http://schemas.microsoft.com/office/drawing/2010/main" val="0"/>
                   </a:ext>
                   <a:ext uri="{96DAC541-7B7A-43D3-8B79-37D633B846F1}">
-                    <asvg:svgBlip xmlns:asvg="http://schemas.microsoft.com/office/drawing/2016/SVG/main" r:embed="rId12"/>
+                    <asvg:svgBlip xmlns:asvg="http://schemas.microsoft.com/office/drawing/2016/SVG/main" r:embed="rId13"/>
                   </a:ext>
                 </a:extLst>
               </a:blip>
@@ -12924,13 +12952,13 @@
               <p:nvPr/>
             </p:nvPicPr>
             <p:blipFill>
-              <a:blip r:embed="rId13">
+              <a:blip r:embed="rId14">
                 <a:extLst>
                   <a:ext uri="{28A0092B-C50C-407E-A947-70E740481C1C}">
                     <a14:useLocalDpi xmlns:a14="http://schemas.microsoft.com/office/drawing/2010/main" val="0"/>
                   </a:ext>
                   <a:ext uri="{96DAC541-7B7A-43D3-8B79-37D633B846F1}">
-                    <asvg:svgBlip xmlns:asvg="http://schemas.microsoft.com/office/drawing/2016/SVG/main" r:embed="rId14"/>
+                    <asvg:svgBlip xmlns:asvg="http://schemas.microsoft.com/office/drawing/2016/SVG/main" r:embed="rId15"/>
                   </a:ext>
                 </a:extLst>
               </a:blip>
@@ -12963,13 +12991,13 @@
               <p:nvPr/>
             </p:nvPicPr>
             <p:blipFill>
-              <a:blip r:embed="rId13">
+              <a:blip r:embed="rId14">
                 <a:extLst>
                   <a:ext uri="{28A0092B-C50C-407E-A947-70E740481C1C}">
                     <a14:useLocalDpi xmlns:a14="http://schemas.microsoft.com/office/drawing/2010/main" val="0"/>
                   </a:ext>
                   <a:ext uri="{96DAC541-7B7A-43D3-8B79-37D633B846F1}">
-                    <asvg:svgBlip xmlns:asvg="http://schemas.microsoft.com/office/drawing/2016/SVG/main" r:embed="rId14"/>
+                    <asvg:svgBlip xmlns:asvg="http://schemas.microsoft.com/office/drawing/2016/SVG/main" r:embed="rId15"/>
                   </a:ext>
                 </a:extLst>
               </a:blip>
@@ -13140,7 +13168,7 @@
           <p:nvPr/>
         </p:nvPicPr>
         <p:blipFill rotWithShape="1">
-          <a:blip r:embed="rId17">
+          <a:blip r:embed="rId18">
             <a:extLst>
               <a:ext uri="{28A0092B-C50C-407E-A947-70E740481C1C}">
                 <a14:useLocalDpi xmlns:a14="http://schemas.microsoft.com/office/drawing/2010/main" val="0"/>
@@ -13160,344 +13188,6 @@
           </a:prstGeom>
         </p:spPr>
       </p:pic>
-      <p:sp>
-        <p:nvSpPr>
-          <p:cNvPr id="2" name="TextBox 1">
-            <a:extLst>
-              <a:ext uri="{FF2B5EF4-FFF2-40B4-BE49-F238E27FC236}">
-                <a16:creationId xmlns:a16="http://schemas.microsoft.com/office/drawing/2014/main" id="{ECB3F1A8-DDAA-4B5E-8D19-E144EE6965DB}"/>
-              </a:ext>
-            </a:extLst>
-          </p:cNvPr>
-          <p:cNvSpPr txBox="1"/>
-          <p:nvPr/>
-        </p:nvSpPr>
-        <p:spPr>
-          <a:xfrm>
-            <a:off x="7373320" y="17885708"/>
-            <a:ext cx="6829147" cy="5213735"/>
-          </a:xfrm>
-          <a:prstGeom prst="rect">
-            <a:avLst/>
-          </a:prstGeom>
-          <a:noFill/>
-        </p:spPr>
-        <p:txBody>
-          <a:bodyPr wrap="square" rtlCol="0">
-            <a:spAutoFit/>
-          </a:bodyPr>
-          <a:lstStyle/>
-          <a:p>
-            <a:pPr>
-              <a:lnSpc>
-                <a:spcPct val="140000"/>
-              </a:lnSpc>
-            </a:pPr>
-            <a:r>
-              <a:rPr lang="en-IN" sz="2600" dirty="0">
-                <a:solidFill>
-                  <a:schemeClr val="accent6">
-                    <a:lumMod val="75000"/>
-                  </a:schemeClr>
-                </a:solidFill>
-                <a:latin typeface="Arial Nova" panose="020B0604020202020204" pitchFamily="34" charset="0"/>
-                <a:cs typeface="Arial" panose="020B0604020202020204" pitchFamily="34" charset="0"/>
-              </a:rPr>
-              <a:t>1. For edges(u, v) inserted, add node v to 	update_list, if f(v)</a:t>
-            </a:r>
-            <a:r>
-              <a:rPr lang="en-IN" sz="2600" baseline="-25000" dirty="0">
-                <a:solidFill>
-                  <a:schemeClr val="accent6">
-                    <a:lumMod val="75000"/>
-                  </a:schemeClr>
-                </a:solidFill>
-                <a:latin typeface="Arial Nova" panose="020B0604020202020204" pitchFamily="34" charset="0"/>
-                <a:cs typeface="Arial" panose="020B0604020202020204" pitchFamily="34" charset="0"/>
-              </a:rPr>
-              <a:t>new</a:t>
-            </a:r>
-            <a:r>
-              <a:rPr lang="en-IN" sz="2600" dirty="0">
-                <a:solidFill>
-                  <a:schemeClr val="accent6">
-                    <a:lumMod val="75000"/>
-                  </a:schemeClr>
-                </a:solidFill>
-                <a:latin typeface="Arial Nova" panose="020B0604020202020204" pitchFamily="34" charset="0"/>
-                <a:cs typeface="Arial" panose="020B0604020202020204" pitchFamily="34" charset="0"/>
-              </a:rPr>
-              <a:t> &lt; f(v)</a:t>
-            </a:r>
-            <a:r>
-              <a:rPr lang="en-IN" sz="2600" baseline="-25000" dirty="0">
-                <a:solidFill>
-                  <a:schemeClr val="accent6">
-                    <a:lumMod val="75000"/>
-                  </a:schemeClr>
-                </a:solidFill>
-                <a:latin typeface="Arial Nova" panose="020B0604020202020204" pitchFamily="34" charset="0"/>
-                <a:cs typeface="Arial" panose="020B0604020202020204" pitchFamily="34" charset="0"/>
-              </a:rPr>
-              <a:t>old</a:t>
-            </a:r>
-            <a:r>
-              <a:rPr lang="en-IN" sz="2600" dirty="0">
-                <a:solidFill>
-                  <a:schemeClr val="accent6">
-                    <a:lumMod val="75000"/>
-                  </a:schemeClr>
-                </a:solidFill>
-                <a:latin typeface="Arial Nova" panose="020B0604020202020204" pitchFamily="34" charset="0"/>
-                <a:cs typeface="Arial" panose="020B0604020202020204" pitchFamily="34" charset="0"/>
-              </a:rPr>
-              <a:t>.</a:t>
-            </a:r>
-          </a:p>
-          <a:p>
-            <a:r>
-              <a:rPr lang="en-IN" sz="2600" dirty="0">
-                <a:solidFill>
-                  <a:schemeClr val="accent6">
-                    <a:lumMod val="75000"/>
-                  </a:schemeClr>
-                </a:solidFill>
-                <a:latin typeface="Arial Nova" panose="020B0604020202020204" pitchFamily="34" charset="0"/>
-                <a:cs typeface="Arial" panose="020B0604020202020204" pitchFamily="34" charset="0"/>
-              </a:rPr>
-              <a:t>2. While update_list not empty:</a:t>
-            </a:r>
-          </a:p>
-          <a:p>
-            <a:r>
-              <a:rPr lang="en-IN" sz="2600" dirty="0">
-                <a:solidFill>
-                  <a:schemeClr val="accent6">
-                    <a:lumMod val="75000"/>
-                  </a:schemeClr>
-                </a:solidFill>
-                <a:latin typeface="Arial Nova" panose="020B0604020202020204" pitchFamily="34" charset="0"/>
-                <a:cs typeface="Arial" panose="020B0604020202020204" pitchFamily="34" charset="0"/>
-              </a:rPr>
-              <a:t>	a. Extract node n from update_list.</a:t>
-            </a:r>
-          </a:p>
-          <a:p>
-            <a:r>
-              <a:rPr lang="en-IN" sz="2600" dirty="0">
-                <a:solidFill>
-                  <a:schemeClr val="accent6">
-                    <a:lumMod val="75000"/>
-                  </a:schemeClr>
-                </a:solidFill>
-                <a:latin typeface="Arial Nova" panose="020B0604020202020204" pitchFamily="34" charset="0"/>
-                <a:cs typeface="Arial" panose="020B0604020202020204" pitchFamily="34" charset="0"/>
-              </a:rPr>
-              <a:t>	b. For each child of n:</a:t>
-            </a:r>
-          </a:p>
-          <a:p>
-            <a:r>
-              <a:rPr lang="en-IN" sz="2600" dirty="0">
-                <a:solidFill>
-                  <a:schemeClr val="accent6">
-                    <a:lumMod val="75000"/>
-                  </a:schemeClr>
-                </a:solidFill>
-                <a:latin typeface="Arial Nova" panose="020B0604020202020204" pitchFamily="34" charset="0"/>
-                <a:cs typeface="Arial" panose="020B0604020202020204" pitchFamily="34" charset="0"/>
-              </a:rPr>
-              <a:t>		</a:t>
-            </a:r>
-            <a:r>
-              <a:rPr lang="en-IN" sz="2600" dirty="0" err="1">
-                <a:solidFill>
-                  <a:schemeClr val="accent6">
-                    <a:lumMod val="75000"/>
-                  </a:schemeClr>
-                </a:solidFill>
-                <a:latin typeface="Arial Nova" panose="020B0604020202020204" pitchFamily="34" charset="0"/>
-                <a:cs typeface="Arial" panose="020B0604020202020204" pitchFamily="34" charset="0"/>
-              </a:rPr>
-              <a:t>i</a:t>
-            </a:r>
-            <a:r>
-              <a:rPr lang="en-IN" sz="2600" dirty="0">
-                <a:solidFill>
-                  <a:schemeClr val="accent6">
-                    <a:lumMod val="75000"/>
-                  </a:schemeClr>
-                </a:solidFill>
-                <a:latin typeface="Arial Nova" panose="020B0604020202020204" pitchFamily="34" charset="0"/>
-                <a:cs typeface="Arial" panose="020B0604020202020204" pitchFamily="34" charset="0"/>
-              </a:rPr>
-              <a:t>. </a:t>
-            </a:r>
-            <a:r>
-              <a:rPr lang="en-IN" sz="2600" b="1" dirty="0">
-                <a:solidFill>
-                  <a:schemeClr val="accent6">
-                    <a:lumMod val="75000"/>
-                  </a:schemeClr>
-                </a:solidFill>
-                <a:latin typeface="Arial Nova" panose="020B0604020202020204" pitchFamily="34" charset="0"/>
-                <a:cs typeface="Arial" panose="020B0604020202020204" pitchFamily="34" charset="0"/>
-              </a:rPr>
-              <a:t>lock(child)</a:t>
-            </a:r>
-          </a:p>
-          <a:p>
-            <a:r>
-              <a:rPr lang="en-IN" sz="2600" dirty="0">
-                <a:solidFill>
-                  <a:schemeClr val="accent6">
-                    <a:lumMod val="75000"/>
-                  </a:schemeClr>
-                </a:solidFill>
-                <a:latin typeface="Arial Nova" panose="020B0604020202020204" pitchFamily="34" charset="0"/>
-                <a:cs typeface="Arial" panose="020B0604020202020204" pitchFamily="34" charset="0"/>
-              </a:rPr>
-              <a:t>		ii. if f(child)</a:t>
-            </a:r>
-            <a:r>
-              <a:rPr lang="en-IN" sz="2600" baseline="-25000" dirty="0">
-                <a:solidFill>
-                  <a:schemeClr val="accent6">
-                    <a:lumMod val="75000"/>
-                  </a:schemeClr>
-                </a:solidFill>
-                <a:latin typeface="Arial Nova" panose="020B0604020202020204" pitchFamily="34" charset="0"/>
-                <a:cs typeface="Arial" panose="020B0604020202020204" pitchFamily="34" charset="0"/>
-              </a:rPr>
-              <a:t>new</a:t>
-            </a:r>
-            <a:r>
-              <a:rPr lang="en-IN" sz="2600" dirty="0">
-                <a:solidFill>
-                  <a:schemeClr val="accent6">
-                    <a:lumMod val="75000"/>
-                  </a:schemeClr>
-                </a:solidFill>
-                <a:latin typeface="Arial Nova" panose="020B0604020202020204" pitchFamily="34" charset="0"/>
-                <a:cs typeface="Arial" panose="020B0604020202020204" pitchFamily="34" charset="0"/>
-              </a:rPr>
-              <a:t>&lt; f(child)</a:t>
-            </a:r>
-            <a:r>
-              <a:rPr lang="en-IN" sz="2600" baseline="-25000" dirty="0">
-                <a:solidFill>
-                  <a:schemeClr val="accent6">
-                    <a:lumMod val="75000"/>
-                  </a:schemeClr>
-                </a:solidFill>
-                <a:latin typeface="Arial Nova" panose="020B0604020202020204" pitchFamily="34" charset="0"/>
-                <a:cs typeface="Arial" panose="020B0604020202020204" pitchFamily="34" charset="0"/>
-              </a:rPr>
-              <a:t>old</a:t>
-            </a:r>
-            <a:r>
-              <a:rPr lang="en-IN" sz="2600" dirty="0">
-                <a:solidFill>
-                  <a:schemeClr val="accent6">
-                    <a:lumMod val="75000"/>
-                  </a:schemeClr>
-                </a:solidFill>
-                <a:latin typeface="Arial Nova" panose="020B0604020202020204" pitchFamily="34" charset="0"/>
-                <a:cs typeface="Arial" panose="020B0604020202020204" pitchFamily="34" charset="0"/>
-              </a:rPr>
-              <a:t>, add child</a:t>
-            </a:r>
-          </a:p>
-          <a:p>
-            <a:r>
-              <a:rPr lang="en-IN" sz="2600" dirty="0">
-                <a:solidFill>
-                  <a:schemeClr val="accent6">
-                    <a:lumMod val="75000"/>
-                  </a:schemeClr>
-                </a:solidFill>
-                <a:latin typeface="Arial Nova" panose="020B0604020202020204" pitchFamily="34" charset="0"/>
-                <a:cs typeface="Arial" panose="020B0604020202020204" pitchFamily="34" charset="0"/>
-              </a:rPr>
-              <a:t>			to update_list.</a:t>
-            </a:r>
-          </a:p>
-          <a:p>
-            <a:r>
-              <a:rPr lang="en-IN" sz="2600" dirty="0">
-                <a:solidFill>
-                  <a:schemeClr val="accent6">
-                    <a:lumMod val="75000"/>
-                  </a:schemeClr>
-                </a:solidFill>
-                <a:latin typeface="Arial Nova" panose="020B0604020202020204" pitchFamily="34" charset="0"/>
-                <a:cs typeface="Arial" panose="020B0604020202020204" pitchFamily="34" charset="0"/>
-              </a:rPr>
-              <a:t>		iii. </a:t>
-            </a:r>
-            <a:r>
-              <a:rPr lang="en-IN" sz="2600" b="1" dirty="0">
-                <a:solidFill>
-                  <a:schemeClr val="accent6">
-                    <a:lumMod val="75000"/>
-                  </a:schemeClr>
-                </a:solidFill>
-                <a:latin typeface="Arial Nova" panose="020B0604020202020204" pitchFamily="34" charset="0"/>
-                <a:cs typeface="Arial" panose="020B0604020202020204" pitchFamily="34" charset="0"/>
-              </a:rPr>
-              <a:t>unlock(child)</a:t>
-            </a:r>
-          </a:p>
-          <a:p>
-            <a:endParaRPr lang="en-IN" sz="2600" b="1" dirty="0">
-              <a:solidFill>
-                <a:schemeClr val="accent6">
-                  <a:lumMod val="75000"/>
-                </a:schemeClr>
-              </a:solidFill>
-              <a:latin typeface="Arial Nova" panose="020B0604020202020204" pitchFamily="34" charset="0"/>
-              <a:cs typeface="Arial" panose="020B0604020202020204" pitchFamily="34" charset="0"/>
-            </a:endParaRPr>
-          </a:p>
-          <a:p>
-            <a:r>
-              <a:rPr lang="en-IN" sz="2600" dirty="0">
-                <a:solidFill>
-                  <a:schemeClr val="accent6">
-                    <a:lumMod val="75000"/>
-                  </a:schemeClr>
-                </a:solidFill>
-                <a:latin typeface="Arial Nova" panose="020B0604020202020204" pitchFamily="34" charset="0"/>
-                <a:cs typeface="Arial" panose="020B0604020202020204" pitchFamily="34" charset="0"/>
-              </a:rPr>
-              <a:t> </a:t>
-            </a:r>
-            <a:r>
-              <a:rPr lang="en-IN" sz="2400" dirty="0">
-                <a:solidFill>
-                  <a:schemeClr val="accent6">
-                    <a:lumMod val="75000"/>
-                  </a:schemeClr>
-                </a:solidFill>
-                <a:latin typeface="Arial Nova" panose="020B0604020202020204" pitchFamily="34" charset="0"/>
-                <a:cs typeface="Arial" panose="020B0604020202020204" pitchFamily="34" charset="0"/>
-              </a:rPr>
-              <a:t>f(v) : cost of node v = g(v) + h(v)</a:t>
-            </a:r>
-          </a:p>
-          <a:p>
-            <a:endParaRPr lang="en-IN" sz="2600" dirty="0">
-              <a:solidFill>
-                <a:schemeClr val="accent6">
-                  <a:lumMod val="75000"/>
-                </a:schemeClr>
-              </a:solidFill>
-              <a:latin typeface="Arial" panose="020B0604020202020204" pitchFamily="34" charset="0"/>
-              <a:cs typeface="Arial" panose="020B0604020202020204" pitchFamily="34" charset="0"/>
-            </a:endParaRPr>
-          </a:p>
-        </p:txBody>
-      </p:sp>
       <p:sp>
         <p:nvSpPr>
           <p:cNvPr id="133" name="TextBox 132">
@@ -13572,11 +13262,11 @@
           <p:nvPr/>
         </p:nvPicPr>
         <p:blipFill>
-          <a:blip r:embed="rId18">
+          <a:blip r:embed="rId19">
             <a:extLst>
               <a:ext uri="{BEBA8EAE-BF5A-486C-A8C5-ECC9F3942E4B}">
                 <a14:imgProps xmlns:a14="http://schemas.microsoft.com/office/drawing/2010/main">
-                  <a14:imgLayer r:embed="rId19">
+                  <a14:imgLayer r:embed="rId20">
                     <a14:imgEffect>
                       <a14:backgroundRemoval t="9778" b="91111" l="9821" r="89732">
                         <a14:foregroundMark x1="55804" y1="47111" x2="55357" y2="24889"/>
@@ -13604,7 +13294,7 @@
         </p:blipFill>
         <p:spPr>
           <a:xfrm rot="10800000">
-            <a:off x="4363075" y="18673269"/>
+            <a:off x="4329842" y="18685371"/>
             <a:ext cx="692018" cy="739469"/>
           </a:xfrm>
           <a:prstGeom prst="rect">
@@ -13627,11 +13317,11 @@
           <p:nvPr/>
         </p:nvPicPr>
         <p:blipFill>
-          <a:blip r:embed="rId18">
+          <a:blip r:embed="rId19">
             <a:extLst>
               <a:ext uri="{BEBA8EAE-BF5A-486C-A8C5-ECC9F3942E4B}">
                 <a14:imgProps xmlns:a14="http://schemas.microsoft.com/office/drawing/2010/main">
-                  <a14:imgLayer r:embed="rId19">
+                  <a14:imgLayer r:embed="rId20">
                     <a14:imgEffect>
                       <a14:backgroundRemoval t="9778" b="91111" l="9821" r="89732">
                         <a14:foregroundMark x1="55804" y1="47111" x2="55357" y2="24889"/>
@@ -13659,7 +13349,7 @@
         </p:blipFill>
         <p:spPr>
           <a:xfrm rot="10800000">
-            <a:off x="3493645" y="18728564"/>
+            <a:off x="3522704" y="18693883"/>
             <a:ext cx="692018" cy="739469"/>
           </a:xfrm>
           <a:prstGeom prst="rect">
@@ -14285,7 +13975,7 @@
             <p:nvPr/>
           </p:nvPicPr>
           <p:blipFill rotWithShape="1">
-            <a:blip r:embed="rId20">
+            <a:blip r:embed="rId21">
               <a:extLst>
                 <a:ext uri="{28A0092B-C50C-407E-A947-70E740481C1C}">
                   <a14:useLocalDpi xmlns:a14="http://schemas.microsoft.com/office/drawing/2010/main" val="0"/>
@@ -14505,7 +14195,7 @@
             <p:nvPr/>
           </p:nvPicPr>
           <p:blipFill>
-            <a:blip r:embed="rId21">
+            <a:blip r:embed="rId22">
               <a:extLst>
                 <a:ext uri="{28A0092B-C50C-407E-A947-70E740481C1C}">
                   <a14:useLocalDpi xmlns:a14="http://schemas.microsoft.com/office/drawing/2010/main" val="0"/>
@@ -14597,7 +14287,7 @@
             <p:nvPr/>
           </p:nvPicPr>
           <p:blipFill rotWithShape="1">
-            <a:blip r:embed="rId22">
+            <a:blip r:embed="rId23">
               <a:extLst>
                 <a:ext uri="{28A0092B-C50C-407E-A947-70E740481C1C}">
                   <a14:useLocalDpi xmlns:a14="http://schemas.microsoft.com/office/drawing/2010/main" val="0"/>
@@ -14688,86 +14378,12 @@
           </p:txBody>
         </p:sp>
       </p:grpSp>
-      <p:sp>
-        <p:nvSpPr>
-          <p:cNvPr id="190" name="TextBox 189">
+      <p:grpSp>
+        <p:nvGrpSpPr>
+          <p:cNvPr id="10" name="Group 9">
             <a:extLst>
               <a:ext uri="{FF2B5EF4-FFF2-40B4-BE49-F238E27FC236}">
-                <a16:creationId xmlns:a16="http://schemas.microsoft.com/office/drawing/2014/main" id="{456A582C-A7A7-45F6-A016-555DA935CED7}"/>
-              </a:ext>
-            </a:extLst>
-          </p:cNvPr>
-          <p:cNvSpPr txBox="1"/>
-          <p:nvPr/>
-        </p:nvSpPr>
-        <p:spPr>
-          <a:xfrm>
-            <a:off x="16675750" y="41743852"/>
-            <a:ext cx="13882937" cy="769441"/>
-          </a:xfrm>
-          <a:prstGeom prst="rect">
-            <a:avLst/>
-          </a:prstGeom>
-          <a:noFill/>
-        </p:spPr>
-        <p:txBody>
-          <a:bodyPr wrap="square" rtlCol="0">
-            <a:spAutoFit/>
-          </a:bodyPr>
-          <a:lstStyle/>
-          <a:p>
-            <a:r>
-              <a:rPr lang="en-IN" sz="2200" dirty="0"/>
-              <a:t>Pseudocode described above is to give a basic idea of the algorithm. It does not cover all the cases, for more        information please refer to GitHub.</a:t>
-            </a:r>
-          </a:p>
-        </p:txBody>
-      </p:sp>
-      <p:sp>
-        <p:nvSpPr>
-          <p:cNvPr id="60" name="TextBox 59">
-            <a:extLst>
-              <a:ext uri="{FF2B5EF4-FFF2-40B4-BE49-F238E27FC236}">
-                <a16:creationId xmlns:a16="http://schemas.microsoft.com/office/drawing/2014/main" id="{11992103-AB27-4811-B224-B698FD8096E6}"/>
-              </a:ext>
-            </a:extLst>
-          </p:cNvPr>
-          <p:cNvSpPr txBox="1"/>
-          <p:nvPr/>
-        </p:nvSpPr>
-        <p:spPr>
-          <a:xfrm>
-            <a:off x="16444970" y="41659846"/>
-            <a:ext cx="461559" cy="584775"/>
-          </a:xfrm>
-          <a:prstGeom prst="rect">
-            <a:avLst/>
-          </a:prstGeom>
-          <a:noFill/>
-        </p:spPr>
-        <p:txBody>
-          <a:bodyPr wrap="square" rtlCol="0">
-            <a:spAutoFit/>
-          </a:bodyPr>
-          <a:lstStyle/>
-          <a:p>
-            <a:r>
-              <a:rPr lang="en-IN" sz="3200" dirty="0">
-                <a:solidFill>
-                  <a:srgbClr val="F6416C"/>
-                </a:solidFill>
-              </a:rPr>
-              <a:t>!</a:t>
-            </a:r>
-          </a:p>
-        </p:txBody>
-      </p:sp>
-      <p:grpSp>
-        <p:nvGrpSpPr>
-          <p:cNvPr id="99" name="Group 98">
-            <a:extLst>
-              <a:ext uri="{FF2B5EF4-FFF2-40B4-BE49-F238E27FC236}">
-                <a16:creationId xmlns:a16="http://schemas.microsoft.com/office/drawing/2014/main" id="{BB102D2F-CCC0-4D07-9E4E-225C88A2849C}"/>
+                <a16:creationId xmlns:a16="http://schemas.microsoft.com/office/drawing/2014/main" id="{ABC83E04-C988-4174-BA83-DE180F929AA3}"/>
               </a:ext>
             </a:extLst>
           </p:cNvPr>
@@ -14776,53 +14392,18 @@
         </p:nvGrpSpPr>
         <p:grpSpPr>
           <a:xfrm>
-            <a:off x="1118278" y="32223640"/>
-            <a:ext cx="4572390" cy="4649313"/>
-            <a:chOff x="1010468" y="32536230"/>
-            <a:chExt cx="4572390" cy="4649313"/>
+            <a:off x="16020591" y="41727254"/>
+            <a:ext cx="13900184" cy="802367"/>
+            <a:chOff x="16434692" y="41643248"/>
+            <a:chExt cx="14136946" cy="802367"/>
           </a:xfrm>
         </p:grpSpPr>
-        <p:pic>
-          <p:nvPicPr>
-            <p:cNvPr id="48" name="Picture 47">
+        <p:sp>
+          <p:nvSpPr>
+            <p:cNvPr id="190" name="TextBox 189">
               <a:extLst>
                 <a:ext uri="{FF2B5EF4-FFF2-40B4-BE49-F238E27FC236}">
-                  <a16:creationId xmlns:a16="http://schemas.microsoft.com/office/drawing/2014/main" id="{17E1814A-3E2A-4E79-ADC7-85A7AF8002FF}"/>
-                </a:ext>
-              </a:extLst>
-            </p:cNvPr>
-            <p:cNvPicPr>
-              <a:picLocks noChangeAspect="1"/>
-            </p:cNvPicPr>
-            <p:nvPr/>
-          </p:nvPicPr>
-          <p:blipFill rotWithShape="1">
-            <a:blip r:embed="rId23">
-              <a:extLst>
-                <a:ext uri="{28A0092B-C50C-407E-A947-70E740481C1C}">
-                  <a14:useLocalDpi xmlns:a14="http://schemas.microsoft.com/office/drawing/2010/main" val="0"/>
-                </a:ext>
-              </a:extLst>
-            </a:blip>
-            <a:srcRect l="2699" t="4478" r="1771" b="3196"/>
-            <a:stretch/>
-          </p:blipFill>
-          <p:spPr>
-            <a:xfrm>
-              <a:off x="1010468" y="32536230"/>
-              <a:ext cx="4572390" cy="4649313"/>
-            </a:xfrm>
-            <a:prstGeom prst="rect">
-              <a:avLst/>
-            </a:prstGeom>
-          </p:spPr>
-        </p:pic>
-        <p:sp>
-          <p:nvSpPr>
-            <p:cNvPr id="61" name="TextBox 60">
-              <a:extLst>
-                <a:ext uri="{FF2B5EF4-FFF2-40B4-BE49-F238E27FC236}">
-                  <a16:creationId xmlns:a16="http://schemas.microsoft.com/office/drawing/2014/main" id="{DB2BB718-FA31-4A58-97D0-392A6264418C}"/>
+                  <a16:creationId xmlns:a16="http://schemas.microsoft.com/office/drawing/2014/main" id="{456A582C-A7A7-45F6-A016-555DA935CED7}"/>
                 </a:ext>
               </a:extLst>
             </p:cNvPr>
@@ -14831,8 +14412,8 @@
           </p:nvSpPr>
           <p:spPr>
             <a:xfrm>
-              <a:off x="1353367" y="33302623"/>
-              <a:ext cx="1718514" cy="400110"/>
+              <a:off x="16688701" y="41676174"/>
+              <a:ext cx="13882937" cy="769441"/>
             </a:xfrm>
             <a:prstGeom prst="rect">
               <a:avLst/>
@@ -14846,17 +14427,91 @@
             <a:lstStyle/>
             <a:p>
               <a:r>
-                <a:rPr lang="en-IN" sz="2000" dirty="0">
+                <a:rPr lang="en-IN" sz="2200" dirty="0"/>
+                <a:t>Pseudocode described above is to give a basic idea of the algorithm. It does not cover all the cases, for more        information please refer to GitHub.</a:t>
+              </a:r>
+            </a:p>
+          </p:txBody>
+        </p:sp>
+        <p:sp>
+          <p:nvSpPr>
+            <p:cNvPr id="60" name="TextBox 59">
+              <a:extLst>
+                <a:ext uri="{FF2B5EF4-FFF2-40B4-BE49-F238E27FC236}">
+                  <a16:creationId xmlns:a16="http://schemas.microsoft.com/office/drawing/2014/main" id="{11992103-AB27-4811-B224-B698FD8096E6}"/>
+                </a:ext>
+              </a:extLst>
+            </p:cNvPr>
+            <p:cNvSpPr txBox="1"/>
+            <p:nvPr/>
+          </p:nvSpPr>
+          <p:spPr>
+            <a:xfrm>
+              <a:off x="16434692" y="41643248"/>
+              <a:ext cx="461559" cy="584775"/>
+            </a:xfrm>
+            <a:prstGeom prst="rect">
+              <a:avLst/>
+            </a:prstGeom>
+            <a:noFill/>
+          </p:spPr>
+          <p:txBody>
+            <a:bodyPr wrap="square" rtlCol="0">
+              <a:spAutoFit/>
+            </a:bodyPr>
+            <a:lstStyle/>
+            <a:p>
+              <a:r>
+                <a:rPr lang="en-IN" sz="3200" dirty="0">
                   <a:solidFill>
                     <a:srgbClr val="F6416C"/>
                   </a:solidFill>
                 </a:rPr>
-                <a:t>Deleted edge</a:t>
+                <a:t>!</a:t>
               </a:r>
             </a:p>
           </p:txBody>
         </p:sp>
       </p:grpSp>
+      <p:sp>
+        <p:nvSpPr>
+          <p:cNvPr id="61" name="TextBox 60">
+            <a:extLst>
+              <a:ext uri="{FF2B5EF4-FFF2-40B4-BE49-F238E27FC236}">
+                <a16:creationId xmlns:a16="http://schemas.microsoft.com/office/drawing/2014/main" id="{DB2BB718-FA31-4A58-97D0-392A6264418C}"/>
+              </a:ext>
+            </a:extLst>
+          </p:cNvPr>
+          <p:cNvSpPr txBox="1"/>
+          <p:nvPr/>
+        </p:nvSpPr>
+        <p:spPr>
+          <a:xfrm>
+            <a:off x="1366082" y="32964566"/>
+            <a:ext cx="1718514" cy="400110"/>
+          </a:xfrm>
+          <a:prstGeom prst="rect">
+            <a:avLst/>
+          </a:prstGeom>
+          <a:noFill/>
+        </p:spPr>
+        <p:txBody>
+          <a:bodyPr wrap="square" rtlCol="0">
+            <a:spAutoFit/>
+          </a:bodyPr>
+          <a:lstStyle/>
+          <a:p>
+            <a:r>
+              <a:rPr lang="en-IN" sz="2000" dirty="0">
+                <a:solidFill>
+                  <a:srgbClr val="F6416C"/>
+                </a:solidFill>
+              </a:rPr>
+              <a:t>Deleted edge</a:t>
+            </a:r>
+          </a:p>
+        </p:txBody>
+      </p:sp>
       <p:sp>
         <p:nvSpPr>
           <p:cNvPr id="186" name="TextBox 185">
@@ -14925,6 +14580,358 @@
               <a:rPr lang="en-IN" sz="2200" dirty="0"/>
               <a:t>Fig 6: Comparison b/w static A* and dynamic A* on solving 5000 x 5000 maze</a:t>
             </a:r>
+          </a:p>
+        </p:txBody>
+      </p:sp>
+      <p:sp>
+        <p:nvSpPr>
+          <p:cNvPr id="180" name="TextBox 179">
+            <a:extLst>
+              <a:ext uri="{FF2B5EF4-FFF2-40B4-BE49-F238E27FC236}">
+                <a16:creationId xmlns:a16="http://schemas.microsoft.com/office/drawing/2014/main" id="{3289E757-C028-424D-B2BF-519171B63B34}"/>
+              </a:ext>
+            </a:extLst>
+          </p:cNvPr>
+          <p:cNvSpPr txBox="1"/>
+          <p:nvPr/>
+        </p:nvSpPr>
+        <p:spPr>
+          <a:xfrm>
+            <a:off x="7366130" y="17876018"/>
+            <a:ext cx="6730395" cy="4862870"/>
+          </a:xfrm>
+          <a:prstGeom prst="rect">
+            <a:avLst/>
+          </a:prstGeom>
+          <a:noFill/>
+        </p:spPr>
+        <p:txBody>
+          <a:bodyPr wrap="square" rtlCol="0">
+            <a:spAutoFit/>
+          </a:bodyPr>
+          <a:lstStyle/>
+          <a:p>
+            <a:pPr marL="457200" indent="-457200">
+              <a:buFontTx/>
+              <a:buAutoNum type="arabicPeriod"/>
+            </a:pPr>
+            <a:r>
+              <a:rPr lang="en-IN" sz="2600" dirty="0">
+                <a:solidFill>
+                  <a:schemeClr val="accent6">
+                    <a:lumMod val="75000"/>
+                  </a:schemeClr>
+                </a:solidFill>
+                <a:latin typeface="Arial" panose="020B0604020202020204" pitchFamily="34" charset="0"/>
+                <a:cs typeface="Arial" panose="020B0604020202020204" pitchFamily="34" charset="0"/>
+              </a:rPr>
+              <a:t>For edges(u, v) inserted, add node v to       	update_list, if f(v)</a:t>
+            </a:r>
+            <a:r>
+              <a:rPr lang="en-IN" sz="2600" baseline="-25000" dirty="0">
+                <a:solidFill>
+                  <a:schemeClr val="accent6">
+                    <a:lumMod val="75000"/>
+                  </a:schemeClr>
+                </a:solidFill>
+                <a:latin typeface="Arial" panose="020B0604020202020204" pitchFamily="34" charset="0"/>
+                <a:cs typeface="Arial" panose="020B0604020202020204" pitchFamily="34" charset="0"/>
+              </a:rPr>
+              <a:t>new</a:t>
+            </a:r>
+            <a:r>
+              <a:rPr lang="en-IN" sz="2600" dirty="0">
+                <a:solidFill>
+                  <a:schemeClr val="accent6">
+                    <a:lumMod val="75000"/>
+                  </a:schemeClr>
+                </a:solidFill>
+                <a:latin typeface="Arial" panose="020B0604020202020204" pitchFamily="34" charset="0"/>
+                <a:cs typeface="Arial" panose="020B0604020202020204" pitchFamily="34" charset="0"/>
+              </a:rPr>
+              <a:t> &lt; f(v)</a:t>
+            </a:r>
+            <a:r>
+              <a:rPr lang="en-IN" sz="2600" baseline="-25000" dirty="0">
+                <a:solidFill>
+                  <a:schemeClr val="accent6">
+                    <a:lumMod val="75000"/>
+                  </a:schemeClr>
+                </a:solidFill>
+                <a:latin typeface="Arial" panose="020B0604020202020204" pitchFamily="34" charset="0"/>
+                <a:cs typeface="Arial" panose="020B0604020202020204" pitchFamily="34" charset="0"/>
+              </a:rPr>
+              <a:t>old</a:t>
+            </a:r>
+            <a:r>
+              <a:rPr lang="en-IN" sz="2600" dirty="0">
+                <a:solidFill>
+                  <a:schemeClr val="accent6">
+                    <a:lumMod val="75000"/>
+                  </a:schemeClr>
+                </a:solidFill>
+                <a:latin typeface="Arial" panose="020B0604020202020204" pitchFamily="34" charset="0"/>
+                <a:cs typeface="Arial" panose="020B0604020202020204" pitchFamily="34" charset="0"/>
+              </a:rPr>
+              <a:t>.</a:t>
+            </a:r>
+          </a:p>
+          <a:p>
+            <a:pPr marL="457200" indent="-457200">
+              <a:buFontTx/>
+              <a:buAutoNum type="arabicPeriod"/>
+            </a:pPr>
+            <a:r>
+              <a:rPr lang="en-IN" sz="2600" dirty="0">
+                <a:solidFill>
+                  <a:schemeClr val="accent6">
+                    <a:lumMod val="75000"/>
+                  </a:schemeClr>
+                </a:solidFill>
+                <a:latin typeface="Arial" panose="020B0604020202020204" pitchFamily="34" charset="0"/>
+                <a:cs typeface="Arial" panose="020B0604020202020204" pitchFamily="34" charset="0"/>
+              </a:rPr>
+              <a:t>While update_list not empty:</a:t>
+            </a:r>
+          </a:p>
+          <a:p>
+            <a:pPr lvl="1"/>
+            <a:r>
+              <a:rPr lang="en-IN" sz="2600" dirty="0">
+                <a:solidFill>
+                  <a:schemeClr val="accent6">
+                    <a:lumMod val="75000"/>
+                  </a:schemeClr>
+                </a:solidFill>
+                <a:latin typeface="Arial" panose="020B0604020202020204" pitchFamily="34" charset="0"/>
+                <a:cs typeface="Arial" panose="020B0604020202020204" pitchFamily="34" charset="0"/>
+              </a:rPr>
+              <a:t>a. Extract node n from update_list.</a:t>
+            </a:r>
+          </a:p>
+          <a:p>
+            <a:r>
+              <a:rPr lang="en-IN" sz="2600" dirty="0">
+                <a:solidFill>
+                  <a:schemeClr val="accent6">
+                    <a:lumMod val="75000"/>
+                  </a:schemeClr>
+                </a:solidFill>
+                <a:latin typeface="Arial" panose="020B0604020202020204" pitchFamily="34" charset="0"/>
+                <a:cs typeface="Arial" panose="020B0604020202020204" pitchFamily="34" charset="0"/>
+              </a:rPr>
+              <a:t>	b. For each child of n:</a:t>
+            </a:r>
+          </a:p>
+          <a:p>
+            <a:r>
+              <a:rPr lang="en-IN" sz="2600" dirty="0">
+                <a:solidFill>
+                  <a:schemeClr val="accent6">
+                    <a:lumMod val="75000"/>
+                  </a:schemeClr>
+                </a:solidFill>
+                <a:latin typeface="Arial" panose="020B0604020202020204" pitchFamily="34" charset="0"/>
+                <a:cs typeface="Arial" panose="020B0604020202020204" pitchFamily="34" charset="0"/>
+              </a:rPr>
+              <a:t>		</a:t>
+            </a:r>
+            <a:r>
+              <a:rPr lang="en-IN" sz="2600" dirty="0" err="1">
+                <a:solidFill>
+                  <a:schemeClr val="accent6">
+                    <a:lumMod val="75000"/>
+                  </a:schemeClr>
+                </a:solidFill>
+                <a:latin typeface="Arial" panose="020B0604020202020204" pitchFamily="34" charset="0"/>
+                <a:cs typeface="Arial" panose="020B0604020202020204" pitchFamily="34" charset="0"/>
+              </a:rPr>
+              <a:t>i</a:t>
+            </a:r>
+            <a:r>
+              <a:rPr lang="en-IN" sz="2600" dirty="0">
+                <a:solidFill>
+                  <a:schemeClr val="accent6">
+                    <a:lumMod val="75000"/>
+                  </a:schemeClr>
+                </a:solidFill>
+                <a:latin typeface="Arial" panose="020B0604020202020204" pitchFamily="34" charset="0"/>
+                <a:cs typeface="Arial" panose="020B0604020202020204" pitchFamily="34" charset="0"/>
+              </a:rPr>
+              <a:t>. </a:t>
+            </a:r>
+            <a:r>
+              <a:rPr lang="en-IN" sz="2600" b="1" dirty="0">
+                <a:solidFill>
+                  <a:schemeClr val="accent6">
+                    <a:lumMod val="75000"/>
+                  </a:schemeClr>
+                </a:solidFill>
+                <a:latin typeface="Arial" panose="020B0604020202020204" pitchFamily="34" charset="0"/>
+                <a:cs typeface="Arial" panose="020B0604020202020204" pitchFamily="34" charset="0"/>
+              </a:rPr>
+              <a:t>lock(child)</a:t>
+            </a:r>
+          </a:p>
+          <a:p>
+            <a:r>
+              <a:rPr lang="en-IN" sz="2600" dirty="0">
+                <a:solidFill>
+                  <a:schemeClr val="accent6">
+                    <a:lumMod val="75000"/>
+                  </a:schemeClr>
+                </a:solidFill>
+                <a:latin typeface="Arial" panose="020B0604020202020204" pitchFamily="34" charset="0"/>
+                <a:cs typeface="Arial" panose="020B0604020202020204" pitchFamily="34" charset="0"/>
+              </a:rPr>
+              <a:t>		ii. if f(child)</a:t>
+            </a:r>
+            <a:r>
+              <a:rPr lang="en-IN" sz="2600" baseline="-25000" dirty="0">
+                <a:solidFill>
+                  <a:schemeClr val="accent6">
+                    <a:lumMod val="75000"/>
+                  </a:schemeClr>
+                </a:solidFill>
+                <a:latin typeface="Arial" panose="020B0604020202020204" pitchFamily="34" charset="0"/>
+                <a:cs typeface="Arial" panose="020B0604020202020204" pitchFamily="34" charset="0"/>
+              </a:rPr>
+              <a:t>new</a:t>
+            </a:r>
+            <a:r>
+              <a:rPr lang="en-IN" sz="2600" dirty="0">
+                <a:solidFill>
+                  <a:schemeClr val="accent6">
+                    <a:lumMod val="75000"/>
+                  </a:schemeClr>
+                </a:solidFill>
+                <a:latin typeface="Arial" panose="020B0604020202020204" pitchFamily="34" charset="0"/>
+                <a:cs typeface="Arial" panose="020B0604020202020204" pitchFamily="34" charset="0"/>
+              </a:rPr>
+              <a:t>&lt; f(child)</a:t>
+            </a:r>
+            <a:r>
+              <a:rPr lang="en-IN" sz="2600" baseline="-25000" dirty="0">
+                <a:solidFill>
+                  <a:schemeClr val="accent6">
+                    <a:lumMod val="75000"/>
+                  </a:schemeClr>
+                </a:solidFill>
+                <a:latin typeface="Arial" panose="020B0604020202020204" pitchFamily="34" charset="0"/>
+                <a:cs typeface="Arial" panose="020B0604020202020204" pitchFamily="34" charset="0"/>
+              </a:rPr>
+              <a:t>old</a:t>
+            </a:r>
+            <a:r>
+              <a:rPr lang="en-IN" sz="2600" dirty="0">
+                <a:solidFill>
+                  <a:schemeClr val="accent6">
+                    <a:lumMod val="75000"/>
+                  </a:schemeClr>
+                </a:solidFill>
+                <a:latin typeface="Arial" panose="020B0604020202020204" pitchFamily="34" charset="0"/>
+                <a:cs typeface="Arial" panose="020B0604020202020204" pitchFamily="34" charset="0"/>
+              </a:rPr>
+              <a:t>, add child</a:t>
+            </a:r>
+          </a:p>
+          <a:p>
+            <a:r>
+              <a:rPr lang="en-IN" sz="2600" dirty="0">
+                <a:solidFill>
+                  <a:schemeClr val="accent6">
+                    <a:lumMod val="75000"/>
+                  </a:schemeClr>
+                </a:solidFill>
+                <a:latin typeface="Arial" panose="020B0604020202020204" pitchFamily="34" charset="0"/>
+                <a:cs typeface="Arial" panose="020B0604020202020204" pitchFamily="34" charset="0"/>
+              </a:rPr>
+              <a:t>			to update_list.</a:t>
+            </a:r>
+          </a:p>
+          <a:p>
+            <a:r>
+              <a:rPr lang="en-IN" sz="2600" dirty="0">
+                <a:solidFill>
+                  <a:schemeClr val="accent6">
+                    <a:lumMod val="75000"/>
+                  </a:schemeClr>
+                </a:solidFill>
+                <a:latin typeface="Arial" panose="020B0604020202020204" pitchFamily="34" charset="0"/>
+                <a:cs typeface="Arial" panose="020B0604020202020204" pitchFamily="34" charset="0"/>
+              </a:rPr>
+              <a:t>		iii. </a:t>
+            </a:r>
+            <a:r>
+              <a:rPr lang="en-IN" sz="2600" b="1" dirty="0">
+                <a:solidFill>
+                  <a:schemeClr val="accent6">
+                    <a:lumMod val="75000"/>
+                  </a:schemeClr>
+                </a:solidFill>
+                <a:latin typeface="Arial" panose="020B0604020202020204" pitchFamily="34" charset="0"/>
+                <a:cs typeface="Arial" panose="020B0604020202020204" pitchFamily="34" charset="0"/>
+              </a:rPr>
+              <a:t>unlock(child)</a:t>
+            </a:r>
+          </a:p>
+          <a:p>
+            <a:endParaRPr lang="en-IN" sz="2600" b="1" dirty="0">
+              <a:solidFill>
+                <a:schemeClr val="accent6">
+                  <a:lumMod val="75000"/>
+                </a:schemeClr>
+              </a:solidFill>
+              <a:latin typeface="Arial" panose="020B0604020202020204" pitchFamily="34" charset="0"/>
+              <a:cs typeface="Arial" panose="020B0604020202020204" pitchFamily="34" charset="0"/>
+            </a:endParaRPr>
+          </a:p>
+          <a:p>
+            <a:r>
+              <a:rPr lang="en-IN" sz="2400" b="1" dirty="0">
+                <a:solidFill>
+                  <a:schemeClr val="accent6">
+                    <a:lumMod val="75000"/>
+                  </a:schemeClr>
+                </a:solidFill>
+                <a:latin typeface="Arial" panose="020B0604020202020204" pitchFamily="34" charset="0"/>
+                <a:cs typeface="Arial" panose="020B0604020202020204" pitchFamily="34" charset="0"/>
+              </a:rPr>
+              <a:t>f(v)</a:t>
+            </a:r>
+            <a:r>
+              <a:rPr lang="en-IN" sz="2400" dirty="0">
+                <a:solidFill>
+                  <a:schemeClr val="accent6">
+                    <a:lumMod val="75000"/>
+                  </a:schemeClr>
+                </a:solidFill>
+                <a:latin typeface="Arial" panose="020B0604020202020204" pitchFamily="34" charset="0"/>
+                <a:cs typeface="Arial" panose="020B0604020202020204" pitchFamily="34" charset="0"/>
+              </a:rPr>
+              <a:t>: cost from source to v + heuristics value of v</a:t>
+            </a:r>
+            <a:endParaRPr lang="en-IN" sz="2400" b="1" dirty="0">
+              <a:solidFill>
+                <a:schemeClr val="accent6">
+                  <a:lumMod val="75000"/>
+                </a:schemeClr>
+              </a:solidFill>
+              <a:latin typeface="Arial" panose="020B0604020202020204" pitchFamily="34" charset="0"/>
+              <a:cs typeface="Arial" panose="020B0604020202020204" pitchFamily="34" charset="0"/>
+            </a:endParaRPr>
+          </a:p>
+          <a:p>
+            <a:pPr lvl="1"/>
+            <a:endParaRPr lang="en-IN" sz="2600" dirty="0">
+              <a:solidFill>
+                <a:schemeClr val="accent6">
+                  <a:lumMod val="75000"/>
+                </a:schemeClr>
+              </a:solidFill>
+              <a:latin typeface="Arial" panose="020B0604020202020204" pitchFamily="34" charset="0"/>
+              <a:cs typeface="Arial" panose="020B0604020202020204" pitchFamily="34" charset="0"/>
+            </a:endParaRPr>
           </a:p>
         </p:txBody>
       </p:sp>

</xml_diff>